<commit_message>
plotting current month on top of baseline
</commit_message>
<xml_diff>
--- a/template.pptx
+++ b/template.pptx
@@ -6,7 +6,6 @@
   </p:sldMasterIdLst>
   <p:sldIdLst>
     <p:sldId id="259" r:id="rId2"/>
-    <p:sldId id="260" r:id="rId3"/>
   </p:sldIdLst>
   <p:sldSz cx="6858000" cy="9144000" type="letter"/>
   <p:notesSz cx="6858000" cy="9144000"/>
@@ -265,7 +264,7 @@
           <a:p>
             <a:fld id="{90D0161B-07B2-4BAD-9EC2-43EA96471412}" type="datetimeFigureOut">
               <a:rPr lang="en-US" smtClean="0"/>
-              <a:t>8/2/23</a:t>
+              <a:t>8/7/23</a:t>
             </a:fld>
             <a:endParaRPr lang="en-US"/>
           </a:p>
@@ -433,7 +432,7 @@
           <a:p>
             <a:fld id="{90D0161B-07B2-4BAD-9EC2-43EA96471412}" type="datetimeFigureOut">
               <a:rPr lang="en-US" smtClean="0"/>
-              <a:t>8/2/23</a:t>
+              <a:t>8/7/23</a:t>
             </a:fld>
             <a:endParaRPr lang="en-US"/>
           </a:p>
@@ -611,7 +610,7 @@
           <a:p>
             <a:fld id="{90D0161B-07B2-4BAD-9EC2-43EA96471412}" type="datetimeFigureOut">
               <a:rPr lang="en-US" smtClean="0"/>
-              <a:t>8/2/23</a:t>
+              <a:t>8/7/23</a:t>
             </a:fld>
             <a:endParaRPr lang="en-US"/>
           </a:p>
@@ -779,7 +778,7 @@
           <a:p>
             <a:fld id="{90D0161B-07B2-4BAD-9EC2-43EA96471412}" type="datetimeFigureOut">
               <a:rPr lang="en-US" smtClean="0"/>
-              <a:t>8/2/23</a:t>
+              <a:t>8/7/23</a:t>
             </a:fld>
             <a:endParaRPr lang="en-US"/>
           </a:p>
@@ -1022,7 +1021,7 @@
           <a:p>
             <a:fld id="{90D0161B-07B2-4BAD-9EC2-43EA96471412}" type="datetimeFigureOut">
               <a:rPr lang="en-US" smtClean="0"/>
-              <a:t>8/2/23</a:t>
+              <a:t>8/7/23</a:t>
             </a:fld>
             <a:endParaRPr lang="en-US"/>
           </a:p>
@@ -1251,7 +1250,7 @@
           <a:p>
             <a:fld id="{90D0161B-07B2-4BAD-9EC2-43EA96471412}" type="datetimeFigureOut">
               <a:rPr lang="en-US" smtClean="0"/>
-              <a:t>8/2/23</a:t>
+              <a:t>8/7/23</a:t>
             </a:fld>
             <a:endParaRPr lang="en-US"/>
           </a:p>
@@ -1615,7 +1614,7 @@
           <a:p>
             <a:fld id="{90D0161B-07B2-4BAD-9EC2-43EA96471412}" type="datetimeFigureOut">
               <a:rPr lang="en-US" smtClean="0"/>
-              <a:t>8/2/23</a:t>
+              <a:t>8/7/23</a:t>
             </a:fld>
             <a:endParaRPr lang="en-US"/>
           </a:p>
@@ -1732,7 +1731,7 @@
           <a:p>
             <a:fld id="{90D0161B-07B2-4BAD-9EC2-43EA96471412}" type="datetimeFigureOut">
               <a:rPr lang="en-US" smtClean="0"/>
-              <a:t>8/2/23</a:t>
+              <a:t>8/7/23</a:t>
             </a:fld>
             <a:endParaRPr lang="en-US"/>
           </a:p>
@@ -1827,7 +1826,7 @@
           <a:p>
             <a:fld id="{90D0161B-07B2-4BAD-9EC2-43EA96471412}" type="datetimeFigureOut">
               <a:rPr lang="en-US" smtClean="0"/>
-              <a:t>8/2/23</a:t>
+              <a:t>8/7/23</a:t>
             </a:fld>
             <a:endParaRPr lang="en-US"/>
           </a:p>
@@ -2102,7 +2101,7 @@
           <a:p>
             <a:fld id="{90D0161B-07B2-4BAD-9EC2-43EA96471412}" type="datetimeFigureOut">
               <a:rPr lang="en-US" smtClean="0"/>
-              <a:t>8/2/23</a:t>
+              <a:t>8/7/23</a:t>
             </a:fld>
             <a:endParaRPr lang="en-US"/>
           </a:p>
@@ -2357,7 +2356,7 @@
           <a:p>
             <a:fld id="{90D0161B-07B2-4BAD-9EC2-43EA96471412}" type="datetimeFigureOut">
               <a:rPr lang="en-US" smtClean="0"/>
-              <a:t>8/2/23</a:t>
+              <a:t>8/7/23</a:t>
             </a:fld>
             <a:endParaRPr lang="en-US"/>
           </a:p>
@@ -2568,7 +2567,7 @@
           <a:p>
             <a:fld id="{90D0161B-07B2-4BAD-9EC2-43EA96471412}" type="datetimeFigureOut">
               <a:rPr lang="en-US" smtClean="0"/>
-              <a:t>8/2/23</a:t>
+              <a:t>8/7/23</a:t>
             </a:fld>
             <a:endParaRPr lang="en-US"/>
           </a:p>
@@ -4117,1155 +4116,6 @@
 </p:sld>
 </file>
 
-<file path=ppt/slides/slide2.xml><?xml version="1.0" encoding="utf-8"?>
-<p:sld xmlns:a="http://schemas.openxmlformats.org/drawingml/2006/main" xmlns:r="http://schemas.openxmlformats.org/officeDocument/2006/relationships" xmlns:p="http://schemas.openxmlformats.org/presentationml/2006/main">
-  <p:cSld>
-    <p:spTree>
-      <p:nvGrpSpPr>
-        <p:cNvPr id="1" name=""/>
-        <p:cNvGrpSpPr/>
-        <p:nvPr/>
-      </p:nvGrpSpPr>
-      <p:grpSpPr>
-        <a:xfrm>
-          <a:off x="0" y="0"/>
-          <a:ext cx="0" cy="0"/>
-          <a:chOff x="0" y="0"/>
-          <a:chExt cx="0" cy="0"/>
-        </a:xfrm>
-      </p:grpSpPr>
-      <p:sp>
-        <p:nvSpPr>
-          <p:cNvPr id="4" name="Rectangle 3">
-            <a:extLst>
-              <a:ext uri="{FF2B5EF4-FFF2-40B4-BE49-F238E27FC236}">
-                <a16:creationId xmlns:a16="http://schemas.microsoft.com/office/drawing/2014/main" id="{A3B9C42A-1796-C9DB-7A5D-56A3B1E54996}"/>
-              </a:ext>
-            </a:extLst>
-          </p:cNvPr>
-          <p:cNvSpPr/>
-          <p:nvPr/>
-        </p:nvSpPr>
-        <p:spPr>
-          <a:xfrm>
-            <a:off x="0" y="1"/>
-            <a:ext cx="6858000" cy="4002877"/>
-          </a:xfrm>
-          <a:prstGeom prst="rect">
-            <a:avLst/>
-          </a:prstGeom>
-          <a:solidFill>
-            <a:srgbClr val="EE7522"/>
-          </a:solidFill>
-          <a:ln>
-            <a:noFill/>
-          </a:ln>
-        </p:spPr>
-        <p:style>
-          <a:lnRef idx="2">
-            <a:schemeClr val="accent1">
-              <a:shade val="50000"/>
-            </a:schemeClr>
-          </a:lnRef>
-          <a:fillRef idx="1">
-            <a:schemeClr val="accent1"/>
-          </a:fillRef>
-          <a:effectRef idx="0">
-            <a:schemeClr val="accent1"/>
-          </a:effectRef>
-          <a:fontRef idx="minor">
-            <a:schemeClr val="lt1"/>
-          </a:fontRef>
-        </p:style>
-        <p:txBody>
-          <a:bodyPr rtlCol="0" anchor="ctr"/>
-          <a:lstStyle/>
-          <a:p>
-            <a:endParaRPr lang="en-US"/>
-          </a:p>
-        </p:txBody>
-      </p:sp>
-      <p:sp>
-        <p:nvSpPr>
-          <p:cNvPr id="6" name="TextBox 5">
-            <a:extLst>
-              <a:ext uri="{FF2B5EF4-FFF2-40B4-BE49-F238E27FC236}">
-                <a16:creationId xmlns:a16="http://schemas.microsoft.com/office/drawing/2014/main" id="{6C1B70E5-18E1-8D13-FEE1-8094C88A53B4}"/>
-              </a:ext>
-            </a:extLst>
-          </p:cNvPr>
-          <p:cNvSpPr txBox="1"/>
-          <p:nvPr/>
-        </p:nvSpPr>
-        <p:spPr>
-          <a:xfrm>
-            <a:off x="379882" y="302850"/>
-            <a:ext cx="5554134" cy="1223027"/>
-          </a:xfrm>
-          <a:prstGeom prst="rect">
-            <a:avLst/>
-          </a:prstGeom>
-          <a:noFill/>
-        </p:spPr>
-        <p:txBody>
-          <a:bodyPr wrap="square" lIns="91440" tIns="45720" rIns="91440" bIns="45720" anchor="t">
-            <a:spAutoFit/>
-          </a:bodyPr>
-          <a:lstStyle/>
-          <a:p>
-            <a:pPr>
-              <a:lnSpc>
-                <a:spcPct val="107000"/>
-              </a:lnSpc>
-            </a:pPr>
-            <a:r>
-              <a:rPr lang="en-AU" sz="2800" b="1" dirty="0">
-                <a:solidFill>
-                  <a:schemeClr val="bg1"/>
-                </a:solidFill>
-                <a:latin typeface="Poppins"/>
-                <a:ea typeface="Calibri" panose="020F0502020204030204" pitchFamily="34" charset="0"/>
-                <a:cs typeface="Poppins"/>
-              </a:rPr>
-              <a:t>Lab 007</a:t>
-            </a:r>
-            <a:endParaRPr lang="en-US" sz="1200" dirty="0">
-              <a:solidFill>
-                <a:schemeClr val="bg1"/>
-              </a:solidFill>
-              <a:latin typeface="Poppins" panose="00000500000000000000" pitchFamily="2" charset="0"/>
-              <a:ea typeface="Calibri" panose="020F0502020204030204" pitchFamily="34" charset="0"/>
-              <a:cs typeface="Poppins" panose="00000500000000000000" pitchFamily="2" charset="0"/>
-            </a:endParaRPr>
-          </a:p>
-          <a:p>
-            <a:pPr>
-              <a:lnSpc>
-                <a:spcPct val="107000"/>
-              </a:lnSpc>
-              <a:spcBef>
-                <a:spcPts val="1200"/>
-              </a:spcBef>
-            </a:pPr>
-            <a:r>
-              <a:rPr lang="en-US" sz="1400" b="1" dirty="0">
-                <a:latin typeface="Poppins" panose="00000500000000000000" pitchFamily="2" charset="0"/>
-                <a:ea typeface="Calibri" panose="020F0502020204030204" pitchFamily="34" charset="0"/>
-                <a:cs typeface="Poppins" panose="00000500000000000000" pitchFamily="2" charset="0"/>
-              </a:rPr>
-              <a:t>Weekly Energy Report </a:t>
-            </a:r>
-            <a:endParaRPr lang="en-US" sz="1050" dirty="0">
-              <a:latin typeface="Poppins" panose="00000500000000000000" pitchFamily="2" charset="0"/>
-              <a:ea typeface="Calibri" panose="020F0502020204030204" pitchFamily="34" charset="0"/>
-              <a:cs typeface="Poppins" panose="00000500000000000000" pitchFamily="2" charset="0"/>
-            </a:endParaRPr>
-          </a:p>
-          <a:p>
-            <a:pPr>
-              <a:lnSpc>
-                <a:spcPct val="107000"/>
-              </a:lnSpc>
-              <a:spcBef>
-                <a:spcPts val="600"/>
-              </a:spcBef>
-              <a:spcAft>
-                <a:spcPts val="800"/>
-              </a:spcAft>
-            </a:pPr>
-            <a:r>
-              <a:rPr lang="en-US" sz="1100" dirty="0">
-                <a:latin typeface="Poppins"/>
-                <a:ea typeface="Calibri" panose="020F0502020204030204" pitchFamily="34" charset="0"/>
-                <a:cs typeface="Poppins"/>
-              </a:rPr>
-              <a:t>May 22–May 28, 2023</a:t>
-            </a:r>
-          </a:p>
-        </p:txBody>
-      </p:sp>
-      <p:sp>
-        <p:nvSpPr>
-          <p:cNvPr id="92" name="TextBox 91">
-            <a:extLst>
-              <a:ext uri="{FF2B5EF4-FFF2-40B4-BE49-F238E27FC236}">
-                <a16:creationId xmlns:a16="http://schemas.microsoft.com/office/drawing/2014/main" id="{698D1336-60BC-46F2-EB9F-E5179F00813E}"/>
-              </a:ext>
-            </a:extLst>
-          </p:cNvPr>
-          <p:cNvSpPr txBox="1"/>
-          <p:nvPr/>
-        </p:nvSpPr>
-        <p:spPr>
-          <a:xfrm>
-            <a:off x="379882" y="1709551"/>
-            <a:ext cx="3708097" cy="558230"/>
-          </a:xfrm>
-          <a:prstGeom prst="rect">
-            <a:avLst/>
-          </a:prstGeom>
-          <a:noFill/>
-        </p:spPr>
-        <p:txBody>
-          <a:bodyPr wrap="square" lIns="91440" tIns="45720" rIns="91440" bIns="45720" anchor="t">
-            <a:spAutoFit/>
-          </a:bodyPr>
-          <a:lstStyle/>
-          <a:p>
-            <a:pPr>
-              <a:lnSpc>
-                <a:spcPct val="107000"/>
-              </a:lnSpc>
-              <a:spcAft>
-                <a:spcPts val="600"/>
-              </a:spcAft>
-            </a:pPr>
-            <a:r>
-              <a:rPr lang="en-US" sz="1200" b="1" dirty="0">
-                <a:solidFill>
-                  <a:schemeClr val="bg1"/>
-                </a:solidFill>
-                <a:latin typeface="Poppins"/>
-                <a:ea typeface="Calibri" panose="020F0502020204030204" pitchFamily="34" charset="0"/>
-                <a:cs typeface="Poppins"/>
-              </a:rPr>
-              <a:t>Your energy reduction this week equates to:*</a:t>
-            </a:r>
-          </a:p>
-          <a:p>
-            <a:pPr>
-              <a:lnSpc>
-                <a:spcPct val="107000"/>
-              </a:lnSpc>
-              <a:spcAft>
-                <a:spcPts val="600"/>
-              </a:spcAft>
-            </a:pPr>
-            <a:endParaRPr lang="en-US" sz="1200" b="1" dirty="0">
-              <a:solidFill>
-                <a:schemeClr val="bg1"/>
-              </a:solidFill>
-              <a:latin typeface="Poppins" panose="00000500000000000000" pitchFamily="2" charset="0"/>
-              <a:ea typeface="Calibri" panose="020F0502020204030204" pitchFamily="34" charset="0"/>
-              <a:cs typeface="Poppins" panose="00000500000000000000" pitchFamily="2" charset="0"/>
-            </a:endParaRPr>
-          </a:p>
-        </p:txBody>
-      </p:sp>
-      <p:graphicFrame>
-        <p:nvGraphicFramePr>
-          <p:cNvPr id="97" name="Table 97">
-            <a:extLst>
-              <a:ext uri="{FF2B5EF4-FFF2-40B4-BE49-F238E27FC236}">
-                <a16:creationId xmlns:a16="http://schemas.microsoft.com/office/drawing/2014/main" id="{3B422D03-B06B-7A4A-806E-64C5C47E6757}"/>
-              </a:ext>
-            </a:extLst>
-          </p:cNvPr>
-          <p:cNvGraphicFramePr>
-            <a:graphicFrameLocks noGrp="1"/>
-          </p:cNvGraphicFramePr>
-          <p:nvPr/>
-        </p:nvGraphicFramePr>
-        <p:xfrm>
-          <a:off x="319621" y="2186036"/>
-          <a:ext cx="5600700" cy="1536603"/>
-        </p:xfrm>
-        <a:graphic>
-          <a:graphicData uri="http://schemas.openxmlformats.org/drawingml/2006/table">
-            <a:tbl>
-              <a:tblPr firstRow="1" bandRow="1">
-                <a:tableStyleId>{2D5ABB26-0587-4C30-8999-92F81FD0307C}</a:tableStyleId>
-              </a:tblPr>
-              <a:tblGrid>
-                <a:gridCol w="1866900">
-                  <a:extLst>
-                    <a:ext uri="{9D8B030D-6E8A-4147-A177-3AD203B41FA5}">
-                      <a16:colId xmlns:a16="http://schemas.microsoft.com/office/drawing/2014/main" val="1925908659"/>
-                    </a:ext>
-                  </a:extLst>
-                </a:gridCol>
-                <a:gridCol w="1866900">
-                  <a:extLst>
-                    <a:ext uri="{9D8B030D-6E8A-4147-A177-3AD203B41FA5}">
-                      <a16:colId xmlns:a16="http://schemas.microsoft.com/office/drawing/2014/main" val="3393473403"/>
-                    </a:ext>
-                  </a:extLst>
-                </a:gridCol>
-                <a:gridCol w="1866900">
-                  <a:extLst>
-                    <a:ext uri="{9D8B030D-6E8A-4147-A177-3AD203B41FA5}">
-                      <a16:colId xmlns:a16="http://schemas.microsoft.com/office/drawing/2014/main" val="1337067495"/>
-                    </a:ext>
-                  </a:extLst>
-                </a:gridCol>
-              </a:tblGrid>
-              <a:tr h="789843">
-                <a:tc>
-                  <a:txBody>
-                    <a:bodyPr/>
-                    <a:lstStyle/>
-                    <a:p>
-                      <a:endParaRPr lang="en-US" sz="3200"/>
-                    </a:p>
-                  </a:txBody>
-                  <a:tcPr/>
-                </a:tc>
-                <a:tc>
-                  <a:txBody>
-                    <a:bodyPr/>
-                    <a:lstStyle/>
-                    <a:p>
-                      <a:endParaRPr lang="en-US" sz="3200"/>
-                    </a:p>
-                  </a:txBody>
-                  <a:tcPr/>
-                </a:tc>
-                <a:tc>
-                  <a:txBody>
-                    <a:bodyPr/>
-                    <a:lstStyle/>
-                    <a:p>
-                      <a:endParaRPr lang="en-US" sz="3200"/>
-                    </a:p>
-                  </a:txBody>
-                  <a:tcPr/>
-                </a:tc>
-                <a:extLst>
-                  <a:ext uri="{0D108BD9-81ED-4DB2-BD59-A6C34878D82A}">
-                    <a16:rowId xmlns:a16="http://schemas.microsoft.com/office/drawing/2014/main" val="2671459511"/>
-                  </a:ext>
-                </a:extLst>
-              </a:tr>
-              <a:tr h="739140">
-                <a:tc>
-                  <a:txBody>
-                    <a:bodyPr/>
-                    <a:lstStyle/>
-                    <a:p>
-                      <a:pPr algn="ctr" rtl="0" fontAlgn="base"/>
-                      <a:endParaRPr lang="en-US" sz="2000" b="1" i="0" kern="1200" dirty="0">
-                        <a:solidFill>
-                          <a:schemeClr val="bg1"/>
-                        </a:solidFill>
-                        <a:effectLst/>
-                        <a:latin typeface="Poppins"/>
-                        <a:ea typeface="+mn-ea"/>
-                        <a:cs typeface="Poppins"/>
-                      </a:endParaRPr>
-                    </a:p>
-                    <a:p>
-                      <a:pPr algn="ctr" rtl="0" fontAlgn="base"/>
-                      <a:r>
-                        <a:rPr lang="en-US" sz="1100" b="0" i="0" kern="1200" dirty="0">
-                          <a:solidFill>
-                            <a:schemeClr val="bg1"/>
-                          </a:solidFill>
-                          <a:effectLst/>
-                          <a:latin typeface="Poppins" panose="00000500000000000000" pitchFamily="2" charset="0"/>
-                          <a:ea typeface="+mn-ea"/>
-                          <a:cs typeface="Poppins" panose="00000500000000000000" pitchFamily="2" charset="0"/>
-                        </a:rPr>
-                        <a:t>Miles Driven </a:t>
-                      </a:r>
-                    </a:p>
-                  </a:txBody>
-                  <a:tcPr/>
-                </a:tc>
-                <a:tc>
-                  <a:txBody>
-                    <a:bodyPr/>
-                    <a:lstStyle/>
-                    <a:p>
-                      <a:pPr algn="ctr" rtl="0" fontAlgn="base"/>
-                      <a:endParaRPr lang="en-US" sz="2000" b="0" i="0" kern="1200">
-                        <a:solidFill>
-                          <a:schemeClr val="bg1"/>
-                        </a:solidFill>
-                        <a:effectLst/>
-                        <a:latin typeface="Poppins"/>
-                        <a:ea typeface="+mn-ea"/>
-                        <a:cs typeface="Poppins"/>
-                      </a:endParaRPr>
-                    </a:p>
-                    <a:p>
-                      <a:pPr algn="ctr" rtl="0" fontAlgn="base"/>
-                      <a:r>
-                        <a:rPr lang="en-US" sz="1100" b="0" i="0" kern="1200" dirty="0">
-                          <a:solidFill>
-                            <a:schemeClr val="bg1"/>
-                          </a:solidFill>
-                          <a:effectLst/>
-                          <a:latin typeface="Poppins" panose="00000500000000000000" pitchFamily="2" charset="0"/>
-                          <a:ea typeface="+mn-ea"/>
-                          <a:cs typeface="Poppins" panose="00000500000000000000" pitchFamily="2" charset="0"/>
-                        </a:rPr>
-                        <a:t>Smartphones Charged</a:t>
-                      </a:r>
-                    </a:p>
-                    <a:p>
-                      <a:endParaRPr lang="en-US" sz="1200" dirty="0">
-                        <a:solidFill>
-                          <a:schemeClr val="bg1"/>
-                        </a:solidFill>
-                        <a:latin typeface="Poppins" panose="00000500000000000000" pitchFamily="2" charset="0"/>
-                        <a:cs typeface="Poppins" panose="00000500000000000000" pitchFamily="2" charset="0"/>
-                      </a:endParaRPr>
-                    </a:p>
-                  </a:txBody>
-                  <a:tcPr/>
-                </a:tc>
-                <a:tc>
-                  <a:txBody>
-                    <a:bodyPr/>
-                    <a:lstStyle/>
-                    <a:p>
-                      <a:pPr algn="ctr" rtl="0" fontAlgn="base"/>
-                      <a:endParaRPr lang="en-US" sz="2000" b="1" i="0" kern="1200" dirty="0">
-                        <a:solidFill>
-                          <a:schemeClr val="bg1"/>
-                        </a:solidFill>
-                        <a:effectLst/>
-                        <a:latin typeface="Poppins"/>
-                        <a:ea typeface="+mn-ea"/>
-                        <a:cs typeface="Poppins"/>
-                      </a:endParaRPr>
-                    </a:p>
-                    <a:p>
-                      <a:pPr algn="ctr" rtl="0" fontAlgn="base"/>
-                      <a:r>
-                        <a:rPr lang="en-US" sz="1000" b="0" i="0" kern="1200" dirty="0">
-                          <a:solidFill>
-                            <a:schemeClr val="bg1"/>
-                          </a:solidFill>
-                          <a:effectLst/>
-                          <a:latin typeface="Poppins" panose="00000500000000000000" pitchFamily="2" charset="0"/>
-                          <a:ea typeface="+mn-ea"/>
-                          <a:cs typeface="Poppins" panose="00000500000000000000" pitchFamily="2" charset="0"/>
-                        </a:rPr>
-                        <a:t>Homes’ Yearly Energy Usage</a:t>
-                      </a:r>
-                    </a:p>
-                  </a:txBody>
-                  <a:tcPr/>
-                </a:tc>
-                <a:extLst>
-                  <a:ext uri="{0D108BD9-81ED-4DB2-BD59-A6C34878D82A}">
-                    <a16:rowId xmlns:a16="http://schemas.microsoft.com/office/drawing/2014/main" val="3830652391"/>
-                  </a:ext>
-                </a:extLst>
-              </a:tr>
-            </a:tbl>
-          </a:graphicData>
-        </a:graphic>
-      </p:graphicFrame>
-      <p:sp>
-        <p:nvSpPr>
-          <p:cNvPr id="106" name="TextBox 105">
-            <a:extLst>
-              <a:ext uri="{FF2B5EF4-FFF2-40B4-BE49-F238E27FC236}">
-                <a16:creationId xmlns:a16="http://schemas.microsoft.com/office/drawing/2014/main" id="{9FF94971-F4DB-125E-EED3-C387D0EC9DCA}"/>
-              </a:ext>
-            </a:extLst>
-          </p:cNvPr>
-          <p:cNvSpPr txBox="1"/>
-          <p:nvPr/>
-        </p:nvSpPr>
-        <p:spPr>
-          <a:xfrm>
-            <a:off x="523651" y="3663996"/>
-            <a:ext cx="3928532" cy="217432"/>
-          </a:xfrm>
-          <a:prstGeom prst="rect">
-            <a:avLst/>
-          </a:prstGeom>
-          <a:noFill/>
-        </p:spPr>
-        <p:txBody>
-          <a:bodyPr wrap="square" lIns="91440" tIns="45720" rIns="91440" bIns="45720" anchor="t">
-            <a:spAutoFit/>
-          </a:bodyPr>
-          <a:lstStyle/>
-          <a:p>
-            <a:pPr>
-              <a:lnSpc>
-                <a:spcPct val="107000"/>
-              </a:lnSpc>
-              <a:spcAft>
-                <a:spcPts val="600"/>
-              </a:spcAft>
-            </a:pPr>
-            <a:r>
-              <a:rPr lang="en-US" sz="800">
-                <a:solidFill>
-                  <a:schemeClr val="bg1"/>
-                </a:solidFill>
-                <a:latin typeface="Arial Nova"/>
-                <a:ea typeface="Calibri" panose="020F0502020204030204" pitchFamily="34" charset="0"/>
-                <a:cs typeface="Cordia New"/>
-              </a:rPr>
-              <a:t>*compared to average baseline energy usage </a:t>
-            </a:r>
-            <a:r>
-              <a:rPr lang="en-US" sz="800">
-                <a:solidFill>
-                  <a:schemeClr val="bg1"/>
-                </a:solidFill>
-                <a:ea typeface="+mn-lt"/>
-                <a:cs typeface="+mn-lt"/>
-              </a:rPr>
-              <a:t>prior to pilot commencement</a:t>
-            </a:r>
-            <a:endParaRPr lang="en-US" sz="800">
-              <a:solidFill>
-                <a:schemeClr val="bg1"/>
-              </a:solidFill>
-              <a:latin typeface="Arial Nova" panose="020B0504020202020204" pitchFamily="34" charset="0"/>
-              <a:ea typeface="Calibri" panose="020F0502020204030204" pitchFamily="34" charset="0"/>
-              <a:cs typeface="Cordia New" panose="020B0304020202020204" pitchFamily="34" charset="-34"/>
-            </a:endParaRPr>
-          </a:p>
-        </p:txBody>
-      </p:sp>
-      <p:graphicFrame>
-        <p:nvGraphicFramePr>
-          <p:cNvPr id="2" name="Table 73">
-            <a:extLst>
-              <a:ext uri="{FF2B5EF4-FFF2-40B4-BE49-F238E27FC236}">
-                <a16:creationId xmlns:a16="http://schemas.microsoft.com/office/drawing/2014/main" id="{F7C1A2DC-CBBE-DC41-CC52-D640AD2168A6}"/>
-              </a:ext>
-            </a:extLst>
-          </p:cNvPr>
-          <p:cNvGraphicFramePr>
-            <a:graphicFrameLocks noGrp="1"/>
-          </p:cNvGraphicFramePr>
-          <p:nvPr/>
-        </p:nvGraphicFramePr>
-        <p:xfrm>
-          <a:off x="4907313" y="346223"/>
-          <a:ext cx="1488695" cy="1083685"/>
-        </p:xfrm>
-        <a:graphic>
-          <a:graphicData uri="http://schemas.openxmlformats.org/drawingml/2006/table">
-            <a:tbl>
-              <a:tblPr firstRow="1" bandRow="1">
-                <a:tableStyleId>{2D5ABB26-0587-4C30-8999-92F81FD0307C}</a:tableStyleId>
-              </a:tblPr>
-              <a:tblGrid>
-                <a:gridCol w="1488695">
-                  <a:extLst>
-                    <a:ext uri="{9D8B030D-6E8A-4147-A177-3AD203B41FA5}">
-                      <a16:colId xmlns:a16="http://schemas.microsoft.com/office/drawing/2014/main" val="1047524567"/>
-                    </a:ext>
-                  </a:extLst>
-                </a:gridCol>
-              </a:tblGrid>
-              <a:tr h="507685">
-                <a:tc>
-                  <a:txBody>
-                    <a:bodyPr/>
-                    <a:lstStyle/>
-                    <a:p>
-                      <a:pPr algn="ctr"/>
-                      <a:r>
-                        <a:rPr lang="en-US" sz="1200" b="1" dirty="0">
-                          <a:solidFill>
-                            <a:schemeClr val="tx1"/>
-                          </a:solidFill>
-                          <a:latin typeface="Poppins"/>
-                          <a:cs typeface="Poppins"/>
-                        </a:rPr>
-                        <a:t>Fume Hood Alerts</a:t>
-                      </a:r>
-                    </a:p>
-                  </a:txBody>
-                  <a:tcPr anchor="ctr">
-                    <a:lnL w="12700" cap="flat" cmpd="sng" algn="ctr">
-                      <a:solidFill>
-                        <a:schemeClr val="tx1"/>
-                      </a:solidFill>
-                      <a:prstDash val="solid"/>
-                      <a:round/>
-                      <a:headEnd type="none" w="med" len="med"/>
-                      <a:tailEnd type="none" w="med" len="med"/>
-                    </a:lnL>
-                    <a:lnR w="12700" cap="flat" cmpd="sng" algn="ctr">
-                      <a:solidFill>
-                        <a:schemeClr val="tx1"/>
-                      </a:solidFill>
-                      <a:prstDash val="solid"/>
-                      <a:round/>
-                      <a:headEnd type="none" w="med" len="med"/>
-                      <a:tailEnd type="none" w="med" len="med"/>
-                    </a:lnR>
-                    <a:lnT w="12700" cap="flat" cmpd="sng" algn="ctr">
-                      <a:solidFill>
-                        <a:schemeClr val="tx1"/>
-                      </a:solidFill>
-                      <a:prstDash val="solid"/>
-                      <a:round/>
-                      <a:headEnd type="none" w="med" len="med"/>
-                      <a:tailEnd type="none" w="med" len="med"/>
-                    </a:lnT>
-                    <a:lnB w="12700" cap="flat" cmpd="sng" algn="ctr">
-                      <a:noFill/>
-                      <a:prstDash val="solid"/>
-                      <a:round/>
-                      <a:headEnd type="none" w="med" len="med"/>
-                      <a:tailEnd type="none" w="med" len="med"/>
-                    </a:lnB>
-                    <a:lnTlToBr w="12700" cmpd="sng">
-                      <a:noFill/>
-                      <a:prstDash val="solid"/>
-                    </a:lnTlToBr>
-                    <a:lnBlToTr w="12700" cmpd="sng">
-                      <a:noFill/>
-                      <a:prstDash val="solid"/>
-                    </a:lnBlToTr>
-                    <a:noFill/>
-                  </a:tcPr>
-                </a:tc>
-                <a:extLst>
-                  <a:ext uri="{0D108BD9-81ED-4DB2-BD59-A6C34878D82A}">
-                    <a16:rowId xmlns:a16="http://schemas.microsoft.com/office/drawing/2014/main" val="423460731"/>
-                  </a:ext>
-                </a:extLst>
-              </a:tr>
-              <a:tr h="576000">
-                <a:tc>
-                  <a:txBody>
-                    <a:bodyPr/>
-                    <a:lstStyle/>
-                    <a:p>
-                      <a:pPr algn="ctr"/>
-                      <a:endParaRPr lang="en-US" sz="2800" b="1" dirty="0">
-                        <a:solidFill>
-                          <a:schemeClr val="tx1"/>
-                        </a:solidFill>
-                        <a:latin typeface="Poppins"/>
-                        <a:cs typeface="Poppins"/>
-                      </a:endParaRPr>
-                    </a:p>
-                  </a:txBody>
-                  <a:tcPr anchor="ctr">
-                    <a:lnL w="12700" cap="flat" cmpd="sng" algn="ctr">
-                      <a:solidFill>
-                        <a:schemeClr val="tx1"/>
-                      </a:solidFill>
-                      <a:prstDash val="solid"/>
-                      <a:round/>
-                      <a:headEnd type="none" w="med" len="med"/>
-                      <a:tailEnd type="none" w="med" len="med"/>
-                    </a:lnL>
-                    <a:lnR w="12700" cap="flat" cmpd="sng" algn="ctr">
-                      <a:solidFill>
-                        <a:schemeClr val="tx1"/>
-                      </a:solidFill>
-                      <a:prstDash val="solid"/>
-                      <a:round/>
-                      <a:headEnd type="none" w="med" len="med"/>
-                      <a:tailEnd type="none" w="med" len="med"/>
-                    </a:lnR>
-                    <a:lnT w="12700" cap="flat" cmpd="sng" algn="ctr">
-                      <a:noFill/>
-                      <a:prstDash val="solid"/>
-                      <a:round/>
-                      <a:headEnd type="none" w="med" len="med"/>
-                      <a:tailEnd type="none" w="med" len="med"/>
-                    </a:lnT>
-                    <a:lnB w="12700" cap="flat" cmpd="sng" algn="ctr">
-                      <a:solidFill>
-                        <a:schemeClr val="tx1"/>
-                      </a:solidFill>
-                      <a:prstDash val="solid"/>
-                      <a:round/>
-                      <a:headEnd type="none" w="med" len="med"/>
-                      <a:tailEnd type="none" w="med" len="med"/>
-                    </a:lnB>
-                    <a:lnTlToBr w="12700" cmpd="sng">
-                      <a:noFill/>
-                      <a:prstDash val="solid"/>
-                    </a:lnTlToBr>
-                    <a:lnBlToTr w="12700" cmpd="sng">
-                      <a:noFill/>
-                      <a:prstDash val="solid"/>
-                    </a:lnBlToTr>
-                    <a:noFill/>
-                  </a:tcPr>
-                </a:tc>
-                <a:extLst>
-                  <a:ext uri="{0D108BD9-81ED-4DB2-BD59-A6C34878D82A}">
-                    <a16:rowId xmlns:a16="http://schemas.microsoft.com/office/drawing/2014/main" val="4174918850"/>
-                  </a:ext>
-                </a:extLst>
-              </a:tr>
-            </a:tbl>
-          </a:graphicData>
-        </a:graphic>
-      </p:graphicFrame>
-      <p:grpSp>
-        <p:nvGrpSpPr>
-          <p:cNvPr id="7" name="Group 6">
-            <a:extLst>
-              <a:ext uri="{FF2B5EF4-FFF2-40B4-BE49-F238E27FC236}">
-                <a16:creationId xmlns:a16="http://schemas.microsoft.com/office/drawing/2014/main" id="{C99B6131-22B0-9694-C7FF-0D4D0BB5B79F}"/>
-              </a:ext>
-            </a:extLst>
-          </p:cNvPr>
-          <p:cNvGrpSpPr/>
-          <p:nvPr/>
-        </p:nvGrpSpPr>
-        <p:grpSpPr>
-          <a:xfrm>
-            <a:off x="5008491" y="6175001"/>
-            <a:ext cx="1442079" cy="1606709"/>
-            <a:chOff x="5198762" y="4325154"/>
-            <a:chExt cx="1442079" cy="1606709"/>
-          </a:xfrm>
-        </p:grpSpPr>
-        <p:sp>
-          <p:nvSpPr>
-            <p:cNvPr id="13" name="Oval 12">
-              <a:extLst>
-                <a:ext uri="{FF2B5EF4-FFF2-40B4-BE49-F238E27FC236}">
-                  <a16:creationId xmlns:a16="http://schemas.microsoft.com/office/drawing/2014/main" id="{1256647E-393C-56EB-2321-0034A495DE78}"/>
-                </a:ext>
-              </a:extLst>
-            </p:cNvPr>
-            <p:cNvSpPr/>
-            <p:nvPr/>
-          </p:nvSpPr>
-          <p:spPr>
-            <a:xfrm>
-              <a:off x="5198762" y="4325154"/>
-              <a:ext cx="1426222" cy="1404592"/>
-            </a:xfrm>
-            <a:prstGeom prst="ellipse">
-              <a:avLst/>
-            </a:prstGeom>
-            <a:solidFill>
-              <a:schemeClr val="bg1"/>
-            </a:solidFill>
-            <a:ln w="57150">
-              <a:solidFill>
-                <a:schemeClr val="bg2">
-                  <a:lumMod val="25000"/>
-                </a:schemeClr>
-              </a:solidFill>
-            </a:ln>
-          </p:spPr>
-          <p:style>
-            <a:lnRef idx="2">
-              <a:schemeClr val="accent1">
-                <a:shade val="50000"/>
-              </a:schemeClr>
-            </a:lnRef>
-            <a:fillRef idx="1">
-              <a:schemeClr val="accent1"/>
-            </a:fillRef>
-            <a:effectRef idx="0">
-              <a:schemeClr val="accent1"/>
-            </a:effectRef>
-            <a:fontRef idx="minor">
-              <a:schemeClr val="lt1"/>
-            </a:fontRef>
-          </p:style>
-          <p:txBody>
-            <a:bodyPr rtlCol="0" anchor="ctr"/>
-            <a:lstStyle/>
-            <a:p>
-              <a:pPr algn="ctr"/>
-              <a:endParaRPr lang="en-US"/>
-            </a:p>
-          </p:txBody>
-        </p:sp>
-        <p:pic>
-          <p:nvPicPr>
-            <p:cNvPr id="3" name="Picture 2" descr="A picture containing text&#10;&#10;Description automatically generated">
-              <a:extLst>
-                <a:ext uri="{FF2B5EF4-FFF2-40B4-BE49-F238E27FC236}">
-                  <a16:creationId xmlns:a16="http://schemas.microsoft.com/office/drawing/2014/main" id="{77CFA521-37BD-758F-8170-90CA72BE4ED3}"/>
-                </a:ext>
-              </a:extLst>
-            </p:cNvPr>
-            <p:cNvPicPr>
-              <a:picLocks noChangeAspect="1"/>
-            </p:cNvPicPr>
-            <p:nvPr/>
-          </p:nvPicPr>
-          <p:blipFill rotWithShape="1">
-            <a:blip r:embed="rId2">
-              <a:extLst>
-                <a:ext uri="{28A0092B-C50C-407E-A947-70E740481C1C}">
-                  <a14:useLocalDpi xmlns:a14="http://schemas.microsoft.com/office/drawing/2010/main" val="0"/>
-                </a:ext>
-              </a:extLst>
-            </a:blip>
-            <a:srcRect r="28796"/>
-            <a:stretch/>
-          </p:blipFill>
-          <p:spPr>
-            <a:xfrm>
-              <a:off x="5667151" y="5210510"/>
-              <a:ext cx="770255" cy="721353"/>
-            </a:xfrm>
-            <a:prstGeom prst="rect">
-              <a:avLst/>
-            </a:prstGeom>
-          </p:spPr>
-        </p:pic>
-        <p:sp>
-          <p:nvSpPr>
-            <p:cNvPr id="5" name="Rectangle 1">
-              <a:extLst>
-                <a:ext uri="{FF2B5EF4-FFF2-40B4-BE49-F238E27FC236}">
-                  <a16:creationId xmlns:a16="http://schemas.microsoft.com/office/drawing/2014/main" id="{72D08DD8-0106-2D0F-3E2F-CE8AA9BE6144}"/>
-                </a:ext>
-              </a:extLst>
-            </p:cNvPr>
-            <p:cNvSpPr>
-              <a:spLocks noChangeArrowheads="1"/>
-            </p:cNvSpPr>
-            <p:nvPr/>
-          </p:nvSpPr>
-          <p:spPr bwMode="auto">
-            <a:xfrm>
-              <a:off x="5251382" y="4743083"/>
-              <a:ext cx="1389459" cy="261610"/>
-            </a:xfrm>
-            <a:prstGeom prst="rect">
-              <a:avLst/>
-            </a:prstGeom>
-            <a:noFill/>
-            <a:ln>
-              <a:noFill/>
-            </a:ln>
-            <a:effectLst/>
-            <a:extLst>
-              <a:ext uri="{909E8E84-426E-40DD-AFC4-6F175D3DCCD1}">
-                <a14:hiddenFill xmlns:a14="http://schemas.microsoft.com/office/drawing/2010/main">
-                  <a:solidFill>
-                    <a:schemeClr val="accent1"/>
-                  </a:solidFill>
-                </a14:hiddenFill>
-              </a:ext>
-              <a:ext uri="{91240B29-F687-4F45-9708-019B960494DF}">
-                <a14:hiddenLine xmlns:a14="http://schemas.microsoft.com/office/drawing/2010/main" w="9525">
-                  <a:solidFill>
-                    <a:schemeClr val="tx1"/>
-                  </a:solidFill>
-                  <a:miter lim="800000"/>
-                  <a:headEnd/>
-                  <a:tailEnd/>
-                </a14:hiddenLine>
-              </a:ext>
-              <a:ext uri="{AF507438-7753-43E0-B8FC-AC1667EBCBE1}">
-                <a14:hiddenEffects xmlns:a14="http://schemas.microsoft.com/office/drawing/2010/main">
-                  <a:effectLst>
-                    <a:outerShdw dist="35921" dir="2700000" algn="ctr" rotWithShape="0">
-                      <a:schemeClr val="bg2"/>
-                    </a:outerShdw>
-                  </a:effectLst>
-                </a14:hiddenEffects>
-              </a:ext>
-            </a:extLst>
-          </p:spPr>
-          <p:txBody>
-            <a:bodyPr vert="horz" wrap="square" lIns="91440" tIns="45720" rIns="91440" bIns="45720" numCol="1" anchor="ctr" anchorCtr="0" compatLnSpc="1">
-              <a:prstTxWarp prst="textNoShape">
-                <a:avLst/>
-              </a:prstTxWarp>
-              <a:spAutoFit/>
-            </a:bodyPr>
-            <a:lstStyle/>
-            <a:p>
-              <a:pPr algn="ctr" defTabSz="914466" eaLnBrk="0" fontAlgn="base" hangingPunct="0">
-                <a:spcBef>
-                  <a:spcPct val="0"/>
-                </a:spcBef>
-                <a:spcAft>
-                  <a:spcPct val="0"/>
-                </a:spcAft>
-              </a:pPr>
-              <a:r>
-                <a:rPr lang="en-US" altLang="en-US" sz="1100" b="1">
-                  <a:latin typeface="Poppins" panose="00000500000000000000" pitchFamily="2" charset="0"/>
-                  <a:ea typeface="Calibri" panose="020F0502020204030204" pitchFamily="34" charset="0"/>
-                  <a:cs typeface="Poppins" panose="00000500000000000000" pitchFamily="2" charset="0"/>
-                </a:rPr>
-                <a:t>Lab of the Week</a:t>
-              </a:r>
-            </a:p>
-          </p:txBody>
-        </p:sp>
-        <p:sp>
-          <p:nvSpPr>
-            <p:cNvPr id="8" name="TextBox 7">
-              <a:extLst>
-                <a:ext uri="{FF2B5EF4-FFF2-40B4-BE49-F238E27FC236}">
-                  <a16:creationId xmlns:a16="http://schemas.microsoft.com/office/drawing/2014/main" id="{6A460694-237C-0E89-E3F3-ABE68A7BC6DA}"/>
-                </a:ext>
-              </a:extLst>
-            </p:cNvPr>
-            <p:cNvSpPr txBox="1"/>
-            <p:nvPr/>
-          </p:nvSpPr>
-          <p:spPr>
-            <a:xfrm>
-              <a:off x="5498309" y="4994155"/>
-              <a:ext cx="898405" cy="315536"/>
-            </a:xfrm>
-            <a:prstGeom prst="rect">
-              <a:avLst/>
-            </a:prstGeom>
-            <a:noFill/>
-          </p:spPr>
-          <p:txBody>
-            <a:bodyPr wrap="square" lIns="91440" tIns="45720" rIns="91440" bIns="45720" anchor="t">
-              <a:spAutoFit/>
-            </a:bodyPr>
-            <a:lstStyle/>
-            <a:p>
-              <a:pPr>
-                <a:lnSpc>
-                  <a:spcPct val="107000"/>
-                </a:lnSpc>
-              </a:pPr>
-              <a:endParaRPr lang="en-US" sz="1400" b="1" dirty="0">
-                <a:solidFill>
-                  <a:srgbClr val="EE7522"/>
-                </a:solidFill>
-                <a:latin typeface="Poppins" panose="00000500000000000000" pitchFamily="2" charset="0"/>
-                <a:ea typeface="Calibri" panose="020F0502020204030204" pitchFamily="34" charset="0"/>
-                <a:cs typeface="Poppins" panose="00000500000000000000" pitchFamily="2" charset="0"/>
-              </a:endParaRPr>
-            </a:p>
-          </p:txBody>
-        </p:sp>
-        <p:pic>
-          <p:nvPicPr>
-            <p:cNvPr id="12" name="Picture 11" descr="A picture containing text&#10;&#10;Description automatically generated">
-              <a:extLst>
-                <a:ext uri="{FF2B5EF4-FFF2-40B4-BE49-F238E27FC236}">
-                  <a16:creationId xmlns:a16="http://schemas.microsoft.com/office/drawing/2014/main" id="{BFE4021A-275D-385B-0658-4E69C6250BE8}"/>
-                </a:ext>
-              </a:extLst>
-            </p:cNvPr>
-            <p:cNvPicPr>
-              <a:picLocks noChangeAspect="1"/>
-            </p:cNvPicPr>
-            <p:nvPr/>
-          </p:nvPicPr>
-          <p:blipFill rotWithShape="1">
-            <a:blip r:embed="rId2">
-              <a:extLst>
-                <a:ext uri="{28A0092B-C50C-407E-A947-70E740481C1C}">
-                  <a14:useLocalDpi xmlns:a14="http://schemas.microsoft.com/office/drawing/2010/main" val="0"/>
-                </a:ext>
-              </a:extLst>
-            </a:blip>
-            <a:srcRect r="28796"/>
-            <a:stretch/>
-          </p:blipFill>
-          <p:spPr>
-            <a:xfrm flipH="1">
-              <a:off x="5416968" y="5201210"/>
-              <a:ext cx="770255" cy="721353"/>
-            </a:xfrm>
-            <a:prstGeom prst="rect">
-              <a:avLst/>
-            </a:prstGeom>
-          </p:spPr>
-        </p:pic>
-      </p:grpSp>
-      <p:sp>
-        <p:nvSpPr>
-          <p:cNvPr id="11" name="TextBox 10">
-            <a:extLst>
-              <a:ext uri="{FF2B5EF4-FFF2-40B4-BE49-F238E27FC236}">
-                <a16:creationId xmlns:a16="http://schemas.microsoft.com/office/drawing/2014/main" id="{2AD2ECAF-2EF2-1936-3F3C-E5D7D3FBC376}"/>
-              </a:ext>
-            </a:extLst>
-          </p:cNvPr>
-          <p:cNvSpPr txBox="1"/>
-          <p:nvPr/>
-        </p:nvSpPr>
-        <p:spPr>
-          <a:xfrm>
-            <a:off x="5073856" y="7830665"/>
-            <a:ext cx="1426221" cy="900246"/>
-          </a:xfrm>
-          <a:prstGeom prst="rect">
-            <a:avLst/>
-          </a:prstGeom>
-          <a:noFill/>
-        </p:spPr>
-        <p:txBody>
-          <a:bodyPr wrap="square" rtlCol="0">
-            <a:spAutoFit/>
-          </a:bodyPr>
-          <a:lstStyle/>
-          <a:p>
-            <a:pPr algn="ctr"/>
-            <a:r>
-              <a:rPr lang="en-AU" sz="1050" i="1">
-                <a:latin typeface="arial nova" panose="020B0504020202020204" pitchFamily="34" charset="0"/>
-              </a:rPr>
-              <a:t>Lab of the week highlights the lab that demonstrated the largest energy  reduction this week</a:t>
-            </a:r>
-          </a:p>
-        </p:txBody>
-      </p:sp>
-      <p:pic>
-        <p:nvPicPr>
-          <p:cNvPr id="18" name="Graphic 17" descr="Car with solid fill">
-            <a:extLst>
-              <a:ext uri="{FF2B5EF4-FFF2-40B4-BE49-F238E27FC236}">
-                <a16:creationId xmlns:a16="http://schemas.microsoft.com/office/drawing/2014/main" id="{19DED771-B0D5-F430-060D-11C9BE2FD728}"/>
-              </a:ext>
-            </a:extLst>
-          </p:cNvPr>
-          <p:cNvPicPr>
-            <a:picLocks noChangeAspect="1"/>
-          </p:cNvPicPr>
-          <p:nvPr/>
-        </p:nvPicPr>
-        <p:blipFill>
-          <a:blip r:embed="rId3">
-            <a:extLst>
-              <a:ext uri="{28A0092B-C50C-407E-A947-70E740481C1C}">
-                <a14:useLocalDpi xmlns:a14="http://schemas.microsoft.com/office/drawing/2010/main" val="0"/>
-              </a:ext>
-              <a:ext uri="{96DAC541-7B7A-43D3-8B79-37D633B846F1}">
-                <asvg:svgBlip xmlns:asvg="http://schemas.microsoft.com/office/drawing/2016/SVG/main" r:embed="rId4"/>
-              </a:ext>
-            </a:extLst>
-          </a:blip>
-          <a:stretch>
-            <a:fillRect/>
-          </a:stretch>
-        </p:blipFill>
-        <p:spPr>
-          <a:xfrm>
-            <a:off x="800101" y="2142378"/>
-            <a:ext cx="864000" cy="864000"/>
-          </a:xfrm>
-          <a:prstGeom prst="rect">
-            <a:avLst/>
-          </a:prstGeom>
-          <a:effectLst>
-            <a:outerShdw blurRad="50800" dist="38100" dir="5400000" algn="t" rotWithShape="0">
-              <a:prstClr val="black">
-                <a:alpha val="40000"/>
-              </a:prstClr>
-            </a:outerShdw>
-          </a:effectLst>
-        </p:spPr>
-      </p:pic>
-      <p:pic>
-        <p:nvPicPr>
-          <p:cNvPr id="19" name="Graphic 18" descr="Smart Phone with solid fill">
-            <a:extLst>
-              <a:ext uri="{FF2B5EF4-FFF2-40B4-BE49-F238E27FC236}">
-                <a16:creationId xmlns:a16="http://schemas.microsoft.com/office/drawing/2014/main" id="{D8E15B18-1ACF-FAB8-B59B-06A2B09BB659}"/>
-              </a:ext>
-            </a:extLst>
-          </p:cNvPr>
-          <p:cNvPicPr>
-            <a:picLocks noChangeAspect="1"/>
-          </p:cNvPicPr>
-          <p:nvPr/>
-        </p:nvPicPr>
-        <p:blipFill>
-          <a:blip r:embed="rId5">
-            <a:extLst>
-              <a:ext uri="{28A0092B-C50C-407E-A947-70E740481C1C}">
-                <a14:useLocalDpi xmlns:a14="http://schemas.microsoft.com/office/drawing/2010/main" val="0"/>
-              </a:ext>
-              <a:ext uri="{96DAC541-7B7A-43D3-8B79-37D633B846F1}">
-                <asvg:svgBlip xmlns:asvg="http://schemas.microsoft.com/office/drawing/2016/SVG/main" r:embed="rId6"/>
-              </a:ext>
-            </a:extLst>
-          </a:blip>
-          <a:stretch>
-            <a:fillRect/>
-          </a:stretch>
-        </p:blipFill>
-        <p:spPr>
-          <a:xfrm>
-            <a:off x="2794920" y="2240755"/>
-            <a:ext cx="612000" cy="612000"/>
-          </a:xfrm>
-          <a:prstGeom prst="rect">
-            <a:avLst/>
-          </a:prstGeom>
-          <a:effectLst>
-            <a:outerShdw blurRad="50800" dist="38100" dir="5400000" algn="t" rotWithShape="0">
-              <a:prstClr val="black">
-                <a:alpha val="40000"/>
-              </a:prstClr>
-            </a:outerShdw>
-          </a:effectLst>
-        </p:spPr>
-      </p:pic>
-      <p:pic>
-        <p:nvPicPr>
-          <p:cNvPr id="20" name="Graphic 19" descr="House with solid fill">
-            <a:extLst>
-              <a:ext uri="{FF2B5EF4-FFF2-40B4-BE49-F238E27FC236}">
-                <a16:creationId xmlns:a16="http://schemas.microsoft.com/office/drawing/2014/main" id="{63B5C644-B3B9-80D6-F589-5245E9B3BEB8}"/>
-              </a:ext>
-            </a:extLst>
-          </p:cNvPr>
-          <p:cNvPicPr>
-            <a:picLocks noChangeAspect="1"/>
-          </p:cNvPicPr>
-          <p:nvPr/>
-        </p:nvPicPr>
-        <p:blipFill>
-          <a:blip r:embed="rId7">
-            <a:extLst>
-              <a:ext uri="{28A0092B-C50C-407E-A947-70E740481C1C}">
-                <a14:useLocalDpi xmlns:a14="http://schemas.microsoft.com/office/drawing/2010/main" val="0"/>
-              </a:ext>
-              <a:ext uri="{96DAC541-7B7A-43D3-8B79-37D633B846F1}">
-                <asvg:svgBlip xmlns:asvg="http://schemas.microsoft.com/office/drawing/2016/SVG/main" r:embed="rId8"/>
-              </a:ext>
-            </a:extLst>
-          </a:blip>
-          <a:stretch>
-            <a:fillRect/>
-          </a:stretch>
-        </p:blipFill>
-        <p:spPr>
-          <a:xfrm>
-            <a:off x="4576986" y="2155969"/>
-            <a:ext cx="720000" cy="720000"/>
-          </a:xfrm>
-          <a:prstGeom prst="rect">
-            <a:avLst/>
-          </a:prstGeom>
-          <a:effectLst>
-            <a:outerShdw blurRad="50800" dist="38100" dir="5400000" algn="t" rotWithShape="0">
-              <a:prstClr val="black">
-                <a:alpha val="40000"/>
-              </a:prstClr>
-            </a:outerShdw>
-          </a:effectLst>
-        </p:spPr>
-      </p:pic>
-    </p:spTree>
-    <p:extLst>
-      <p:ext uri="{BB962C8B-B14F-4D97-AF65-F5344CB8AC3E}">
-        <p14:creationId xmlns:p14="http://schemas.microsoft.com/office/powerpoint/2010/main" val="3351148444"/>
-      </p:ext>
-    </p:extLst>
-  </p:cSld>
-  <p:clrMapOvr>
-    <a:masterClrMapping/>
-  </p:clrMapOvr>
-</p:sld>
-</file>
-
 <file path=ppt/theme/theme1.xml><?xml version="1.0" encoding="utf-8"?>
 <a:theme xmlns:a="http://schemas.openxmlformats.org/drawingml/2006/main" name="Office Theme">
   <a:themeElements>

</xml_diff>